<commit_message>
Reorganizing, context implementaion started.
</commit_message>
<xml_diff>
--- a/Documents/Repository.pptx
+++ b/Documents/Repository.pptx
@@ -109,7 +109,7 @@
   </p:defaultTextStyle>
   <p:extLst>
     <p:ext uri="{EFAFB233-063F-42B5-8137-9DF3F51BA10A}">
-      <p15:sldGuideLst xmlns:p15="http://schemas.microsoft.com/office/powerpoint/2012/main"/>
+      <p15:sldGuideLst xmlns:p15="http://schemas.microsoft.com/office/powerpoint/2012/main" xmlns=""/>
     </p:ext>
   </p:extLst>
 </p:presentation>
@@ -118,11 +118,7 @@
 <file path=ppt/commentAuthors.xml><?xml version="1.0" encoding="utf-8"?>
 <p:cmAuthorLst xmlns:a="http://schemas.openxmlformats.org/drawingml/2006/main" xmlns:r="http://schemas.openxmlformats.org/officeDocument/2006/relationships" xmlns:p="http://schemas.openxmlformats.org/presentationml/2006/main">
   <p:cmAuthor id="1" name="Sigmar" initials="S" lastIdx="1" clrIdx="0">
-    <p:extLst>
-      <p:ext uri="{19B8F6BF-5375-455C-9EA6-DF929625EA0E}">
-        <p15:presenceInfo xmlns:p15="http://schemas.microsoft.com/office/powerpoint/2012/main" userId="Sigmar" providerId="None"/>
-      </p:ext>
-    </p:extLst>
+    <p:extLst/>
   </p:cmAuthor>
 </p:cmAuthorLst>
 </file>
@@ -258,7 +254,7 @@
           <a:p>
             <a:fld id="{CED696EA-9A60-4D75-B483-0A9A5C1FAB8F}" type="datetimeFigureOut">
               <a:rPr lang="et-EE" smtClean="0"/>
-              <a:t>8.03.2014</a:t>
+              <a:t>24.03.2014</a:t>
             </a:fld>
             <a:endParaRPr lang="et-EE"/>
           </a:p>
@@ -428,7 +424,7 @@
           <a:p>
             <a:fld id="{CED696EA-9A60-4D75-B483-0A9A5C1FAB8F}" type="datetimeFigureOut">
               <a:rPr lang="et-EE" smtClean="0"/>
-              <a:t>8.03.2014</a:t>
+              <a:t>24.03.2014</a:t>
             </a:fld>
             <a:endParaRPr lang="et-EE"/>
           </a:p>
@@ -608,7 +604,7 @@
           <a:p>
             <a:fld id="{CED696EA-9A60-4D75-B483-0A9A5C1FAB8F}" type="datetimeFigureOut">
               <a:rPr lang="et-EE" smtClean="0"/>
-              <a:t>8.03.2014</a:t>
+              <a:t>24.03.2014</a:t>
             </a:fld>
             <a:endParaRPr lang="et-EE"/>
           </a:p>
@@ -778,7 +774,7 @@
           <a:p>
             <a:fld id="{CED696EA-9A60-4D75-B483-0A9A5C1FAB8F}" type="datetimeFigureOut">
               <a:rPr lang="et-EE" smtClean="0"/>
-              <a:t>8.03.2014</a:t>
+              <a:t>24.03.2014</a:t>
             </a:fld>
             <a:endParaRPr lang="et-EE"/>
           </a:p>
@@ -1024,7 +1020,7 @@
           <a:p>
             <a:fld id="{CED696EA-9A60-4D75-B483-0A9A5C1FAB8F}" type="datetimeFigureOut">
               <a:rPr lang="et-EE" smtClean="0"/>
-              <a:t>8.03.2014</a:t>
+              <a:t>24.03.2014</a:t>
             </a:fld>
             <a:endParaRPr lang="et-EE"/>
           </a:p>
@@ -1256,7 +1252,7 @@
           <a:p>
             <a:fld id="{CED696EA-9A60-4D75-B483-0A9A5C1FAB8F}" type="datetimeFigureOut">
               <a:rPr lang="et-EE" smtClean="0"/>
-              <a:t>8.03.2014</a:t>
+              <a:t>24.03.2014</a:t>
             </a:fld>
             <a:endParaRPr lang="et-EE"/>
           </a:p>
@@ -1623,7 +1619,7 @@
           <a:p>
             <a:fld id="{CED696EA-9A60-4D75-B483-0A9A5C1FAB8F}" type="datetimeFigureOut">
               <a:rPr lang="et-EE" smtClean="0"/>
-              <a:t>8.03.2014</a:t>
+              <a:t>24.03.2014</a:t>
             </a:fld>
             <a:endParaRPr lang="et-EE"/>
           </a:p>
@@ -1741,7 +1737,7 @@
           <a:p>
             <a:fld id="{CED696EA-9A60-4D75-B483-0A9A5C1FAB8F}" type="datetimeFigureOut">
               <a:rPr lang="et-EE" smtClean="0"/>
-              <a:t>8.03.2014</a:t>
+              <a:t>24.03.2014</a:t>
             </a:fld>
             <a:endParaRPr lang="et-EE"/>
           </a:p>
@@ -1836,7 +1832,7 @@
           <a:p>
             <a:fld id="{CED696EA-9A60-4D75-B483-0A9A5C1FAB8F}" type="datetimeFigureOut">
               <a:rPr lang="et-EE" smtClean="0"/>
-              <a:t>8.03.2014</a:t>
+              <a:t>24.03.2014</a:t>
             </a:fld>
             <a:endParaRPr lang="et-EE"/>
           </a:p>
@@ -2113,7 +2109,7 @@
           <a:p>
             <a:fld id="{CED696EA-9A60-4D75-B483-0A9A5C1FAB8F}" type="datetimeFigureOut">
               <a:rPr lang="et-EE" smtClean="0"/>
-              <a:t>8.03.2014</a:t>
+              <a:t>24.03.2014</a:t>
             </a:fld>
             <a:endParaRPr lang="et-EE"/>
           </a:p>
@@ -2366,7 +2362,7 @@
           <a:p>
             <a:fld id="{CED696EA-9A60-4D75-B483-0A9A5C1FAB8F}" type="datetimeFigureOut">
               <a:rPr lang="et-EE" smtClean="0"/>
-              <a:t>8.03.2014</a:t>
+              <a:t>24.03.2014</a:t>
             </a:fld>
             <a:endParaRPr lang="et-EE"/>
           </a:p>
@@ -2579,7 +2575,7 @@
           <a:p>
             <a:fld id="{CED696EA-9A60-4D75-B483-0A9A5C1FAB8F}" type="datetimeFigureOut">
               <a:rPr lang="et-EE" smtClean="0"/>
-              <a:t>8.03.2014</a:t>
+              <a:t>24.03.2014</a:t>
             </a:fld>
             <a:endParaRPr lang="et-EE"/>
           </a:p>
@@ -3747,13 +3743,8 @@
           <a:p>
             <a:r>
               <a:rPr lang="et-EE" dirty="0"/>
-              <a:t>Version </a:t>
-            </a:r>
-            <a:r>
-              <a:rPr lang="et-EE" dirty="0"/>
-              <a:t>2</a:t>
-            </a:r>
-            <a:endParaRPr lang="et-EE" dirty="0"/>
+              <a:t>Version 2</a:t>
+            </a:r>
           </a:p>
         </p:txBody>
       </p:sp>
@@ -4211,7 +4202,7 @@
         <p:spPr>
           <a:xfrm>
             <a:off x="768927" y="498764"/>
-            <a:ext cx="14129445" cy="2862322"/>
+            <a:ext cx="14129445" cy="4247317"/>
           </a:xfrm>
           <a:prstGeom prst="rect">
             <a:avLst/>
@@ -4363,6 +4354,87 @@
               <a:t>www.entechsolutions.com/how-to-detect-if-file-is-text-or-binary-using-c</a:t>
             </a:r>
             <a:endParaRPr lang="et-EE" dirty="0" smtClean="0"/>
+          </a:p>
+          <a:p>
+            <a:r>
+              <a:rPr lang="et-EE" dirty="0">
+                <a:hlinkClick r:id="rId11"/>
+              </a:rPr>
+              <a:t>http://</a:t>
+            </a:r>
+            <a:r>
+              <a:rPr lang="et-EE" dirty="0" smtClean="0">
+                <a:hlinkClick r:id="rId11"/>
+              </a:rPr>
+              <a:t>msdn.microsoft.com/en-us/library/system.componentmodel.ichangetracking_methods%28v=vs.110%29.aspx</a:t>
+            </a:r>
+            <a:endParaRPr lang="et-EE" dirty="0" smtClean="0"/>
+          </a:p>
+          <a:p>
+            <a:r>
+              <a:rPr lang="et-EE" dirty="0">
+                <a:hlinkClick r:id="rId12"/>
+              </a:rPr>
+              <a:t>http://</a:t>
+            </a:r>
+            <a:r>
+              <a:rPr lang="et-EE" dirty="0" smtClean="0">
+                <a:hlinkClick r:id="rId12"/>
+              </a:rPr>
+              <a:t>bernhard-richter.blogspot.com/2010/02/tracking-changes-made-to-poco-objects.html</a:t>
+            </a:r>
+            <a:endParaRPr lang="et-EE" dirty="0" smtClean="0"/>
+          </a:p>
+          <a:p>
+            <a:r>
+              <a:rPr lang="et-EE" dirty="0">
+                <a:hlinkClick r:id="rId13"/>
+              </a:rPr>
+              <a:t>http://</a:t>
+            </a:r>
+            <a:r>
+              <a:rPr lang="et-EE" dirty="0" smtClean="0">
+                <a:hlinkClick r:id="rId13"/>
+              </a:rPr>
+              <a:t>stackoverflow.com/questions/2363801/what-would-be-the-best-way-to-implement-change-tracking-on-an-object</a:t>
+            </a:r>
+            <a:endParaRPr lang="et-EE" dirty="0" smtClean="0"/>
+          </a:p>
+          <a:p>
+            <a:r>
+              <a:rPr lang="et-EE" dirty="0">
+                <a:hlinkClick r:id="rId14"/>
+              </a:rPr>
+              <a:t>http://</a:t>
+            </a:r>
+            <a:r>
+              <a:rPr lang="et-EE" dirty="0" smtClean="0">
+                <a:hlinkClick r:id="rId14"/>
+              </a:rPr>
+              <a:t>www.codeproject.com/Articles/34233/Implementing-Audit-history-tracking-using-Prototyp</a:t>
+            </a:r>
+            <a:endParaRPr lang="et-EE" dirty="0" smtClean="0"/>
+          </a:p>
+          <a:p>
+            <a:r>
+              <a:rPr lang="et-EE">
+                <a:hlinkClick r:id="rId15"/>
+              </a:rPr>
+              <a:t>https</a:t>
+            </a:r>
+            <a:r>
+              <a:rPr lang="et-EE">
+                <a:hlinkClick r:id="rId15"/>
+              </a:rPr>
+              <a:t>://</a:t>
+            </a:r>
+            <a:r>
+              <a:rPr lang="et-EE" smtClean="0">
+                <a:hlinkClick r:id="rId15"/>
+              </a:rPr>
+              <a:t>github.com/matthewschrager/Repository</a:t>
+            </a:r>
+            <a:endParaRPr lang="et-EE" smtClean="0"/>
           </a:p>
           <a:p>
             <a:endParaRPr lang="et-EE" dirty="0" smtClean="0"/>
@@ -4637,7 +4709,7 @@
   <a:extraClrSchemeLst/>
   <a:extLst>
     <a:ext uri="{05A4C25C-085E-4340-85A3-A5531E510DB2}">
-      <thm15:themeFamily xmlns:thm15="http://schemas.microsoft.com/office/thememl/2012/main" name="Office Theme" id="{62F939B6-93AF-4DB8-9C6B-D6C7DFDC589F}" vid="{4A3C46E8-61CC-4603-A589-7422A47A8E4A}"/>
+      <thm15:themeFamily xmlns:thm15="http://schemas.microsoft.com/office/thememl/2012/main" xmlns="" name="Office Theme" id="{62F939B6-93AF-4DB8-9C6B-D6C7DFDC589F}" vid="{4A3C46E8-61CC-4603-A589-7422A47A8E4A}"/>
     </a:ext>
   </a:extLst>
 </a:theme>

</xml_diff>